<commit_message>
Update content of Zhibin's teaching materials, add Xiangyun's teaching materials.
</commit_message>
<xml_diff>
--- a/teaching/zhibin/1/第一课_幻灯片.pptx
+++ b/teaching/zhibin/1/第一课_幻灯片.pptx
@@ -5,15 +5,16 @@
     <p:sldMasterId id="2147483648" r:id="rId1"/>
   </p:sldMasterIdLst>
   <p:notesMasterIdLst>
-    <p:notesMasterId r:id="rId8"/>
+    <p:notesMasterId r:id="rId9"/>
   </p:notesMasterIdLst>
   <p:sldIdLst>
     <p:sldId id="259" r:id="rId2"/>
-    <p:sldId id="256" r:id="rId3"/>
-    <p:sldId id="257" r:id="rId4"/>
-    <p:sldId id="258" r:id="rId5"/>
-    <p:sldId id="260" r:id="rId6"/>
-    <p:sldId id="261" r:id="rId7"/>
+    <p:sldId id="262" r:id="rId3"/>
+    <p:sldId id="256" r:id="rId4"/>
+    <p:sldId id="257" r:id="rId5"/>
+    <p:sldId id="258" r:id="rId6"/>
+    <p:sldId id="260" r:id="rId7"/>
+    <p:sldId id="261" r:id="rId8"/>
   </p:sldIdLst>
   <p:sldSz cx="12192000" cy="6858000"/>
   <p:notesSz cx="6858000" cy="9144000"/>
@@ -202,7 +203,7 @@
           <a:p>
             <a:fld id="{3BD4D6CF-9818-364B-96F7-A1A8F8CE4CFE}" type="datetimeFigureOut">
               <a:rPr lang="en-US" smtClean="0"/>
-              <a:t>12/9/17</a:t>
+              <a:t>12/17/17</a:t>
             </a:fld>
             <a:endParaRPr lang="en-US"/>
           </a:p>
@@ -535,7 +536,7 @@
           <a:p>
             <a:fld id="{D4775799-7382-654F-AFBB-23ADDD031F63}" type="slidenum">
               <a:rPr lang="en-US" smtClean="0"/>
-              <a:t>3</a:t>
+              <a:t>4</a:t>
             </a:fld>
             <a:endParaRPr lang="en-US"/>
           </a:p>
@@ -545,6 +546,122 @@
     <p:extLst>
       <p:ext uri="{BB962C8B-B14F-4D97-AF65-F5344CB8AC3E}">
         <p14:creationId xmlns:p14="http://schemas.microsoft.com/office/powerpoint/2010/main" val="226456001"/>
+      </p:ext>
+    </p:extLst>
+  </p:cSld>
+  <p:clrMapOvr>
+    <a:masterClrMapping/>
+  </p:clrMapOvr>
+</p:notes>
+</file>
+
+<file path=ppt/notesSlides/notesSlide2.xml><?xml version="1.0" encoding="utf-8"?>
+<p:notes xmlns:a="http://schemas.openxmlformats.org/drawingml/2006/main" xmlns:r="http://schemas.openxmlformats.org/officeDocument/2006/relationships" xmlns:p="http://schemas.openxmlformats.org/presentationml/2006/main">
+  <p:cSld>
+    <p:spTree>
+      <p:nvGrpSpPr>
+        <p:cNvPr id="1" name=""/>
+        <p:cNvGrpSpPr/>
+        <p:nvPr/>
+      </p:nvGrpSpPr>
+      <p:grpSpPr>
+        <a:xfrm>
+          <a:off x="0" y="0"/>
+          <a:ext cx="0" cy="0"/>
+          <a:chOff x="0" y="0"/>
+          <a:chExt cx="0" cy="0"/>
+        </a:xfrm>
+      </p:grpSpPr>
+      <p:sp>
+        <p:nvSpPr>
+          <p:cNvPr id="2" name="Slide Image Placeholder 1"/>
+          <p:cNvSpPr>
+            <a:spLocks noGrp="1" noRot="1" noChangeAspect="1"/>
+          </p:cNvSpPr>
+          <p:nvPr>
+            <p:ph type="sldImg"/>
+          </p:nvPr>
+        </p:nvSpPr>
+        <p:spPr/>
+      </p:sp>
+      <p:sp>
+        <p:nvSpPr>
+          <p:cNvPr id="3" name="Notes Placeholder 2"/>
+          <p:cNvSpPr>
+            <a:spLocks noGrp="1"/>
+          </p:cNvSpPr>
+          <p:nvPr>
+            <p:ph type="body" idx="1"/>
+          </p:nvPr>
+        </p:nvSpPr>
+        <p:spPr/>
+        <p:txBody>
+          <a:bodyPr/>
+          <a:lstStyle/>
+          <a:p>
+            <a:r>
+              <a:rPr lang="zh-CN" altLang="en-US" dirty="0" smtClean="0"/>
+              <a:t>找一找哪里有</a:t>
+            </a:r>
+            <a:r>
+              <a:rPr lang="en-US" altLang="zh-CN" dirty="0" smtClean="0"/>
+              <a:t>HTML</a:t>
+            </a:r>
+            <a:r>
+              <a:rPr lang="zh-CN" altLang="en-US" dirty="0" smtClean="0"/>
+              <a:t>，哪里有</a:t>
+            </a:r>
+            <a:r>
+              <a:rPr lang="en-US" altLang="zh-CN" dirty="0" smtClean="0"/>
+              <a:t>CSS</a:t>
+            </a:r>
+            <a:r>
+              <a:rPr lang="zh-CN" altLang="en-US" dirty="0" smtClean="0"/>
+              <a:t>。有兴趣的话可以探索一家</a:t>
+            </a:r>
+            <a:r>
+              <a:rPr lang="en-US" altLang="zh-CN" dirty="0" smtClean="0"/>
+              <a:t>JavaScript</a:t>
+            </a:r>
+            <a:r>
+              <a:rPr lang="zh-CN" altLang="en-US" dirty="0" smtClean="0"/>
+              <a:t>。如果你觉得审查元素工具中显示的东西过于复杂，可以尝试访问一个内容相对简单的网站。比如百度首页</a:t>
+            </a:r>
+            <a:r>
+              <a:rPr lang="zh-CN" altLang="en-US" smtClean="0"/>
+              <a:t>的内容就很简单。</a:t>
+            </a:r>
+            <a:endParaRPr lang="en-GB"/>
+          </a:p>
+        </p:txBody>
+      </p:sp>
+      <p:sp>
+        <p:nvSpPr>
+          <p:cNvPr id="4" name="Slide Number Placeholder 3"/>
+          <p:cNvSpPr>
+            <a:spLocks noGrp="1"/>
+          </p:cNvSpPr>
+          <p:nvPr>
+            <p:ph type="sldNum" sz="quarter" idx="10"/>
+          </p:nvPr>
+        </p:nvSpPr>
+        <p:spPr/>
+        <p:txBody>
+          <a:bodyPr/>
+          <a:lstStyle/>
+          <a:p>
+            <a:fld id="{D4775799-7382-654F-AFBB-23ADDD031F63}" type="slidenum">
+              <a:rPr lang="en-US" smtClean="0"/>
+              <a:t>7</a:t>
+            </a:fld>
+            <a:endParaRPr lang="en-US"/>
+          </a:p>
+        </p:txBody>
+      </p:sp>
+    </p:spTree>
+    <p:extLst>
+      <p:ext uri="{BB962C8B-B14F-4D97-AF65-F5344CB8AC3E}">
+        <p14:creationId xmlns:p14="http://schemas.microsoft.com/office/powerpoint/2010/main" val="1435265165"/>
       </p:ext>
     </p:extLst>
   </p:cSld>
@@ -685,7 +802,7 @@
           <a:p>
             <a:fld id="{99FA517D-CF1E-864A-A1E2-11B0132028BE}" type="datetimeFigureOut">
               <a:rPr lang="en-US" smtClean="0"/>
-              <a:t>12/9/17</a:t>
+              <a:t>12/17/17</a:t>
             </a:fld>
             <a:endParaRPr lang="en-US"/>
           </a:p>
@@ -855,7 +972,7 @@
           <a:p>
             <a:fld id="{99FA517D-CF1E-864A-A1E2-11B0132028BE}" type="datetimeFigureOut">
               <a:rPr lang="en-US" smtClean="0"/>
-              <a:t>12/9/17</a:t>
+              <a:t>12/17/17</a:t>
             </a:fld>
             <a:endParaRPr lang="en-US"/>
           </a:p>
@@ -1035,7 +1152,7 @@
           <a:p>
             <a:fld id="{99FA517D-CF1E-864A-A1E2-11B0132028BE}" type="datetimeFigureOut">
               <a:rPr lang="en-US" smtClean="0"/>
-              <a:t>12/9/17</a:t>
+              <a:t>12/17/17</a:t>
             </a:fld>
             <a:endParaRPr lang="en-US"/>
           </a:p>
@@ -1205,7 +1322,7 @@
           <a:p>
             <a:fld id="{99FA517D-CF1E-864A-A1E2-11B0132028BE}" type="datetimeFigureOut">
               <a:rPr lang="en-US" smtClean="0"/>
-              <a:t>12/9/17</a:t>
+              <a:t>12/17/17</a:t>
             </a:fld>
             <a:endParaRPr lang="en-US"/>
           </a:p>
@@ -1451,7 +1568,7 @@
           <a:p>
             <a:fld id="{99FA517D-CF1E-864A-A1E2-11B0132028BE}" type="datetimeFigureOut">
               <a:rPr lang="en-US" smtClean="0"/>
-              <a:t>12/9/17</a:t>
+              <a:t>12/17/17</a:t>
             </a:fld>
             <a:endParaRPr lang="en-US"/>
           </a:p>
@@ -1683,7 +1800,7 @@
           <a:p>
             <a:fld id="{99FA517D-CF1E-864A-A1E2-11B0132028BE}" type="datetimeFigureOut">
               <a:rPr lang="en-US" smtClean="0"/>
-              <a:t>12/9/17</a:t>
+              <a:t>12/17/17</a:t>
             </a:fld>
             <a:endParaRPr lang="en-US"/>
           </a:p>
@@ -2050,7 +2167,7 @@
           <a:p>
             <a:fld id="{99FA517D-CF1E-864A-A1E2-11B0132028BE}" type="datetimeFigureOut">
               <a:rPr lang="en-US" smtClean="0"/>
-              <a:t>12/9/17</a:t>
+              <a:t>12/17/17</a:t>
             </a:fld>
             <a:endParaRPr lang="en-US"/>
           </a:p>
@@ -2168,7 +2285,7 @@
           <a:p>
             <a:fld id="{99FA517D-CF1E-864A-A1E2-11B0132028BE}" type="datetimeFigureOut">
               <a:rPr lang="en-US" smtClean="0"/>
-              <a:t>12/9/17</a:t>
+              <a:t>12/17/17</a:t>
             </a:fld>
             <a:endParaRPr lang="en-US"/>
           </a:p>
@@ -2263,7 +2380,7 @@
           <a:p>
             <a:fld id="{99FA517D-CF1E-864A-A1E2-11B0132028BE}" type="datetimeFigureOut">
               <a:rPr lang="en-US" smtClean="0"/>
-              <a:t>12/9/17</a:t>
+              <a:t>12/17/17</a:t>
             </a:fld>
             <a:endParaRPr lang="en-US"/>
           </a:p>
@@ -2540,7 +2657,7 @@
           <a:p>
             <a:fld id="{99FA517D-CF1E-864A-A1E2-11B0132028BE}" type="datetimeFigureOut">
               <a:rPr lang="en-US" smtClean="0"/>
-              <a:t>12/9/17</a:t>
+              <a:t>12/17/17</a:t>
             </a:fld>
             <a:endParaRPr lang="en-US"/>
           </a:p>
@@ -2793,7 +2910,7 @@
           <a:p>
             <a:fld id="{99FA517D-CF1E-864A-A1E2-11B0132028BE}" type="datetimeFigureOut">
               <a:rPr lang="en-US" smtClean="0"/>
-              <a:t>12/9/17</a:t>
+              <a:t>12/17/17</a:t>
             </a:fld>
             <a:endParaRPr lang="en-US"/>
           </a:p>
@@ -3006,7 +3123,7 @@
           <a:p>
             <a:fld id="{99FA517D-CF1E-864A-A1E2-11B0132028BE}" type="datetimeFigureOut">
               <a:rPr lang="en-US" smtClean="0"/>
-              <a:t>12/9/17</a:t>
+              <a:t>12/17/17</a:t>
             </a:fld>
             <a:endParaRPr lang="en-US"/>
           </a:p>
@@ -3544,6 +3661,74 @@
             <a:spLocks noGrp="1"/>
           </p:cNvSpPr>
           <p:nvPr>
+            <p:ph type="title"/>
+          </p:nvPr>
+        </p:nvSpPr>
+        <p:spPr/>
+        <p:txBody>
+          <a:bodyPr/>
+          <a:lstStyle/>
+          <a:p>
+            <a:endParaRPr lang="en-GB" dirty="0"/>
+          </a:p>
+        </p:txBody>
+      </p:sp>
+      <p:sp>
+        <p:nvSpPr>
+          <p:cNvPr id="4" name="Content Placeholder 3"/>
+          <p:cNvSpPr>
+            <a:spLocks noGrp="1"/>
+          </p:cNvSpPr>
+          <p:nvPr>
+            <p:ph idx="1"/>
+          </p:nvPr>
+        </p:nvSpPr>
+        <p:spPr/>
+        <p:txBody>
+          <a:bodyPr/>
+          <a:lstStyle/>
+          <a:p>
+            <a:endParaRPr lang="en-GB"/>
+          </a:p>
+        </p:txBody>
+      </p:sp>
+    </p:spTree>
+    <p:extLst>
+      <p:ext uri="{BB962C8B-B14F-4D97-AF65-F5344CB8AC3E}">
+        <p14:creationId xmlns:p14="http://schemas.microsoft.com/office/powerpoint/2010/main" val="1748299700"/>
+      </p:ext>
+    </p:extLst>
+  </p:cSld>
+  <p:clrMapOvr>
+    <a:masterClrMapping/>
+  </p:clrMapOvr>
+</p:sld>
+</file>
+
+<file path=ppt/slides/slide3.xml><?xml version="1.0" encoding="utf-8"?>
+<p:sld xmlns:a="http://schemas.openxmlformats.org/drawingml/2006/main" xmlns:r="http://schemas.openxmlformats.org/officeDocument/2006/relationships" xmlns:p="http://schemas.openxmlformats.org/presentationml/2006/main">
+  <p:cSld>
+    <p:spTree>
+      <p:nvGrpSpPr>
+        <p:cNvPr id="1" name=""/>
+        <p:cNvGrpSpPr/>
+        <p:nvPr/>
+      </p:nvGrpSpPr>
+      <p:grpSpPr>
+        <a:xfrm>
+          <a:off x="0" y="0"/>
+          <a:ext cx="0" cy="0"/>
+          <a:chOff x="0" y="0"/>
+          <a:chExt cx="0" cy="0"/>
+        </a:xfrm>
+      </p:grpSpPr>
+      <p:sp>
+        <p:nvSpPr>
+          <p:cNvPr id="2" name="Title 1"/>
+          <p:cNvSpPr>
+            <a:spLocks noGrp="1"/>
+          </p:cNvSpPr>
+          <p:nvPr>
             <p:ph type="ctrTitle"/>
           </p:nvPr>
         </p:nvSpPr>
@@ -3603,7 +3788,7 @@
 </p:sld>
 </file>
 
-<file path=ppt/slides/slide3.xml><?xml version="1.0" encoding="utf-8"?>
+<file path=ppt/slides/slide4.xml><?xml version="1.0" encoding="utf-8"?>
 <p:sld xmlns:a="http://schemas.openxmlformats.org/drawingml/2006/main" xmlns:r="http://schemas.openxmlformats.org/officeDocument/2006/relationships" xmlns:p="http://schemas.openxmlformats.org/presentationml/2006/main">
   <p:cSld>
     <p:spTree>
@@ -4160,30 +4345,6 @@
               <a:rPr lang="zh-CN" altLang="en-US" dirty="0" smtClean="0"/>
               <a:t>网页</a:t>
             </a:r>
-            <a:endParaRPr lang="en-US" dirty="0"/>
-          </a:p>
-        </p:txBody>
-      </p:sp>
-      <p:sp>
-        <p:nvSpPr>
-          <p:cNvPr id="24" name="Title 1"/>
-          <p:cNvSpPr>
-            <a:spLocks noGrp="1"/>
-          </p:cNvSpPr>
-          <p:nvPr>
-            <p:ph type="title"/>
-          </p:nvPr>
-        </p:nvSpPr>
-        <p:spPr>
-          <a:xfrm>
-            <a:off x="838200" y="365125"/>
-            <a:ext cx="10515600" cy="1325563"/>
-          </a:xfrm>
-        </p:spPr>
-        <p:txBody>
-          <a:bodyPr/>
-          <a:lstStyle/>
-          <a:p>
             <a:endParaRPr lang="en-US" dirty="0"/>
           </a:p>
         </p:txBody>
@@ -4860,7 +5021,7 @@
 </p:sld>
 </file>
 
-<file path=ppt/slides/slide4.xml><?xml version="1.0" encoding="utf-8"?>
+<file path=ppt/slides/slide5.xml><?xml version="1.0" encoding="utf-8"?>
 <p:sld xmlns:a="http://schemas.openxmlformats.org/drawingml/2006/main" xmlns:r="http://schemas.openxmlformats.org/officeDocument/2006/relationships" xmlns:p="http://schemas.openxmlformats.org/presentationml/2006/main">
   <p:cSld>
     <p:spTree>
@@ -5069,7 +5230,7 @@
 </p:sld>
 </file>
 
-<file path=ppt/slides/slide5.xml><?xml version="1.0" encoding="utf-8"?>
+<file path=ppt/slides/slide6.xml><?xml version="1.0" encoding="utf-8"?>
 <p:sld xmlns:a="http://schemas.openxmlformats.org/drawingml/2006/main" xmlns:r="http://schemas.openxmlformats.org/officeDocument/2006/relationships" xmlns:p="http://schemas.openxmlformats.org/presentationml/2006/main">
   <p:cSld>
     <p:spTree>
@@ -5130,7 +5291,26 @@
             </a:r>
             <a:r>
               <a:rPr lang="zh-CN" altLang="en-US" dirty="0" smtClean="0"/>
-              <a:t>超文本标记语言。负责网页的内容。</a:t>
+              <a:t>超文本标记语言</a:t>
+            </a:r>
+            <a:r>
+              <a:rPr lang="zh-CN" altLang="en-US" dirty="0" smtClean="0"/>
+              <a:t>。</a:t>
+            </a:r>
+            <a:endParaRPr lang="en-US" altLang="zh-CN" dirty="0" smtClean="0"/>
+          </a:p>
+          <a:p>
+            <a:pPr lvl="1">
+              <a:buFont typeface="Wingdings" charset="2"/>
+              <a:buChar char="§"/>
+            </a:pPr>
+            <a:r>
+              <a:rPr lang="zh-CN" altLang="en-US" dirty="0" smtClean="0"/>
+              <a:t>负责</a:t>
+            </a:r>
+            <a:r>
+              <a:rPr lang="zh-CN" altLang="en-US" dirty="0" smtClean="0"/>
+              <a:t>网页的内容。</a:t>
             </a:r>
             <a:endParaRPr lang="en-US" altLang="zh-CN" dirty="0" smtClean="0"/>
           </a:p>
@@ -5164,7 +5344,7 @@
             </a:r>
             <a:r>
               <a:rPr lang="en-US" altLang="zh-CN" dirty="0" smtClean="0"/>
-              <a:t>Sheets: </a:t>
+              <a:t>Sheets </a:t>
             </a:r>
             <a:r>
               <a:rPr lang="zh-CN" altLang="en-US" dirty="0"/>
@@ -5172,21 +5352,59 @@
             </a:r>
             <a:r>
               <a:rPr lang="zh-CN" altLang="en-US" dirty="0" smtClean="0"/>
-              <a:t>表。负责网页内容的美化、动画等。</a:t>
+              <a:t>表</a:t>
+            </a:r>
+            <a:r>
+              <a:rPr lang="zh-CN" altLang="en-US" dirty="0" smtClean="0"/>
+              <a:t>。</a:t>
             </a:r>
             <a:endParaRPr lang="en-US" altLang="zh-CN" dirty="0" smtClean="0"/>
           </a:p>
           <a:p>
+            <a:pPr lvl="1">
+              <a:buFont typeface="Wingdings" charset="2"/>
+              <a:buChar char="§"/>
+            </a:pPr>
+            <a:r>
+              <a:rPr lang="zh-CN" altLang="en-US" dirty="0" smtClean="0"/>
+              <a:t>负责</a:t>
+            </a:r>
+            <a:r>
+              <a:rPr lang="zh-CN" altLang="en-US" dirty="0" smtClean="0"/>
+              <a:t>网页内容的美化、动画等。</a:t>
+            </a:r>
+            <a:endParaRPr lang="en-US" altLang="zh-CN" dirty="0" smtClean="0"/>
+          </a:p>
+          <a:p>
             <a:endParaRPr lang="en-US" dirty="0"/>
           </a:p>
           <a:p>
             <a:r>
               <a:rPr lang="en-US" altLang="zh-CN" dirty="0" smtClean="0"/>
-              <a:t>JavaScript:</a:t>
+              <a:t>JS: JavaScript </a:t>
+            </a:r>
+            <a:r>
+              <a:rPr lang="en-US" altLang="zh-CN" dirty="0" smtClean="0"/>
+              <a:t>Java</a:t>
             </a:r>
             <a:r>
               <a:rPr lang="zh-CN" altLang="en-US" dirty="0" smtClean="0"/>
-              <a:t> 负责用户交互。</a:t>
+              <a:t>脚本</a:t>
+            </a:r>
+            <a:endParaRPr lang="en-US" altLang="zh-CN" dirty="0" smtClean="0"/>
+          </a:p>
+          <a:p>
+            <a:pPr lvl="1">
+              <a:buFont typeface="Wingdings" charset="2"/>
+              <a:buChar char="§"/>
+            </a:pPr>
+            <a:r>
+              <a:rPr lang="zh-CN" altLang="en-US" dirty="0" smtClean="0"/>
+              <a:t>负责</a:t>
+            </a:r>
+            <a:r>
+              <a:rPr lang="zh-CN" altLang="en-US" dirty="0" smtClean="0"/>
+              <a:t>用户交互。</a:t>
             </a:r>
             <a:endParaRPr lang="en-GB" dirty="0"/>
           </a:p>
@@ -5205,7 +5423,7 @@
 </p:sld>
 </file>
 
-<file path=ppt/slides/slide6.xml><?xml version="1.0" encoding="utf-8"?>
+<file path=ppt/slides/slide7.xml><?xml version="1.0" encoding="utf-8"?>
 <p:sld xmlns:a="http://schemas.openxmlformats.org/drawingml/2006/main" xmlns:r="http://schemas.openxmlformats.org/officeDocument/2006/relationships" xmlns:p="http://schemas.openxmlformats.org/presentationml/2006/main">
   <p:cSld>
     <p:spTree>

</xml_diff>